<commit_message>
correción de sd nefritico_ cuarto commit
</commit_message>
<xml_diff>
--- a/Sindrome nefritico.pptx
+++ b/Sindrome nefritico.pptx
@@ -113,6 +113,11 @@
       </a:defRPr>
     </a:lvl9pPr>
   </p:defaultTextStyle>
+  <p:extLst>
+    <p:ext uri="{EFAFB233-063F-42B5-8137-9DF3F51BA10A}">
+      <p15:sldGuideLst xmlns:p15="http://schemas.microsoft.com/office/powerpoint/2012/main"/>
+    </p:ext>
+  </p:extLst>
 </p:presentation>
 </file>
 
@@ -390,7 +395,7 @@
           <a:p>
             <a:fld id="{1160EA64-D806-43AC-9DF2-F8C432F32B4C}" type="datetimeFigureOut">
               <a:rPr lang="en-US" smtClean="0"/>
-              <a:t>9/26/2022</a:t>
+              <a:t>3/16/2023</a:t>
             </a:fld>
             <a:endParaRPr lang="en-US" dirty="0"/>
           </a:p>
@@ -805,7 +810,7 @@
           <a:p>
             <a:fld id="{1160EA64-D806-43AC-9DF2-F8C432F32B4C}" type="datetimeFigureOut">
               <a:rPr lang="en-US" smtClean="0"/>
-              <a:t>9/26/2022</a:t>
+              <a:t>3/16/2023</a:t>
             </a:fld>
             <a:endParaRPr lang="en-US" dirty="0"/>
           </a:p>
@@ -1143,7 +1148,7 @@
           <a:p>
             <a:fld id="{1160EA64-D806-43AC-9DF2-F8C432F32B4C}" type="datetimeFigureOut">
               <a:rPr lang="en-US" smtClean="0"/>
-              <a:t>9/26/2022</a:t>
+              <a:t>3/16/2023</a:t>
             </a:fld>
             <a:endParaRPr lang="en-US" dirty="0"/>
           </a:p>
@@ -1550,7 +1555,7 @@
           <a:p>
             <a:fld id="{1160EA64-D806-43AC-9DF2-F8C432F32B4C}" type="datetimeFigureOut">
               <a:rPr lang="en-US" smtClean="0"/>
-              <a:t>9/26/2022</a:t>
+              <a:t>3/16/2023</a:t>
             </a:fld>
             <a:endParaRPr lang="en-US" dirty="0"/>
           </a:p>
@@ -2120,7 +2125,7 @@
           <a:p>
             <a:fld id="{1160EA64-D806-43AC-9DF2-F8C432F32B4C}" type="datetimeFigureOut">
               <a:rPr lang="en-US" smtClean="0"/>
-              <a:t>9/26/2022</a:t>
+              <a:t>3/16/2023</a:t>
             </a:fld>
             <a:endParaRPr lang="en-US" dirty="0"/>
           </a:p>
@@ -2803,7 +2808,7 @@
           <a:p>
             <a:fld id="{1160EA64-D806-43AC-9DF2-F8C432F32B4C}" type="datetimeFigureOut">
               <a:rPr lang="en-US" smtClean="0"/>
-              <a:t>9/26/2022</a:t>
+              <a:t>3/16/2023</a:t>
             </a:fld>
             <a:endParaRPr lang="en-US" dirty="0"/>
           </a:p>
@@ -3718,7 +3723,7 @@
           <a:p>
             <a:fld id="{1160EA64-D806-43AC-9DF2-F8C432F32B4C}" type="datetimeFigureOut">
               <a:rPr lang="en-US" smtClean="0"/>
-              <a:t>9/26/2022</a:t>
+              <a:t>3/16/2023</a:t>
             </a:fld>
             <a:endParaRPr lang="en-US" dirty="0"/>
           </a:p>
@@ -4033,7 +4038,7 @@
           <a:p>
             <a:fld id="{E9F9C37B-1D36-470B-8223-D6C91242EC14}" type="datetimeFigureOut">
               <a:rPr lang="en-US" smtClean="0"/>
-              <a:t>9/26/2022</a:t>
+              <a:t>3/16/2023</a:t>
             </a:fld>
             <a:endParaRPr lang="en-US" dirty="0"/>
           </a:p>
@@ -4297,7 +4302,7 @@
           <a:p>
             <a:fld id="{67C6F52A-A82B-47A2-A83A-8C4C91F2D59F}" type="datetimeFigureOut">
               <a:rPr lang="en-US" smtClean="0"/>
-              <a:t>9/26/2022</a:t>
+              <a:t>3/16/2023</a:t>
             </a:fld>
             <a:endParaRPr lang="en-US" dirty="0"/>
           </a:p>
@@ -4620,7 +4625,7 @@
           <a:p>
             <a:fld id="{F070A7B3-6521-4DCA-87E5-044747A908C1}" type="datetimeFigureOut">
               <a:rPr lang="en-US" smtClean="0"/>
-              <a:t>9/26/2022</a:t>
+              <a:t>3/16/2023</a:t>
             </a:fld>
             <a:endParaRPr lang="en-US" dirty="0"/>
           </a:p>
@@ -5010,7 +5015,7 @@
           <a:p>
             <a:fld id="{1160EA64-D806-43AC-9DF2-F8C432F32B4C}" type="datetimeFigureOut">
               <a:rPr lang="en-US" smtClean="0"/>
-              <a:t>9/26/2022</a:t>
+              <a:t>3/16/2023</a:t>
             </a:fld>
             <a:endParaRPr lang="en-US" dirty="0"/>
           </a:p>
@@ -5387,7 +5392,7 @@
           <a:p>
             <a:fld id="{AB134690-1557-4C89-A502-4959FE7FAD70}" type="datetimeFigureOut">
               <a:rPr lang="en-US" smtClean="0"/>
-              <a:t>9/26/2022</a:t>
+              <a:t>3/16/2023</a:t>
             </a:fld>
             <a:endParaRPr lang="en-US" dirty="0"/>
           </a:p>
@@ -5893,7 +5898,7 @@
           <a:p>
             <a:fld id="{4F7D4976-E339-4826-83B7-FBD03F55ECF8}" type="datetimeFigureOut">
               <a:rPr lang="en-US" smtClean="0"/>
-              <a:t>9/26/2022</a:t>
+              <a:t>3/16/2023</a:t>
             </a:fld>
             <a:endParaRPr lang="en-US" dirty="0"/>
           </a:p>
@@ -6150,7 +6155,7 @@
           <a:p>
             <a:fld id="{E1037C31-9E7A-4F99-8774-A0E530DE1A42}" type="datetimeFigureOut">
               <a:rPr lang="en-US" smtClean="0"/>
-              <a:t>9/26/2022</a:t>
+              <a:t>3/16/2023</a:t>
             </a:fld>
             <a:endParaRPr lang="en-US" dirty="0"/>
           </a:p>
@@ -6313,7 +6318,7 @@
           <a:p>
             <a:fld id="{C278504F-A551-4DE0-9316-4DCD1D8CC752}" type="datetimeFigureOut">
               <a:rPr lang="en-US" smtClean="0"/>
-              <a:t>9/26/2022</a:t>
+              <a:t>3/16/2023</a:t>
             </a:fld>
             <a:endParaRPr lang="en-US" dirty="0"/>
           </a:p>
@@ -6703,7 +6708,7 @@
           <a:p>
             <a:fld id="{D1BE4249-C0D0-4B06-8692-E8BB871AF643}" type="datetimeFigureOut">
               <a:rPr lang="en-US" smtClean="0"/>
-              <a:t>9/26/2022</a:t>
+              <a:t>3/16/2023</a:t>
             </a:fld>
             <a:endParaRPr lang="en-US" dirty="0"/>
           </a:p>
@@ -7112,7 +7117,7 @@
           <a:p>
             <a:fld id="{042B0DB6-F5C7-45FB-8CF3-31B45F9C2DAC}" type="datetimeFigureOut">
               <a:rPr lang="en-US" smtClean="0"/>
-              <a:t>9/26/2022</a:t>
+              <a:t>3/16/2023</a:t>
             </a:fld>
             <a:endParaRPr lang="en-US" dirty="0"/>
           </a:p>
@@ -7356,7 +7361,7 @@
           <a:p>
             <a:fld id="{1160EA64-D806-43AC-9DF2-F8C432F32B4C}" type="datetimeFigureOut">
               <a:rPr lang="en-US" smtClean="0"/>
-              <a:t>9/26/2022</a:t>
+              <a:t>3/16/2023</a:t>
             </a:fld>
             <a:endParaRPr lang="en-US" dirty="0"/>
           </a:p>
@@ -7993,8 +7998,8 @@
           <a:lstStyle/>
           <a:p>
             <a:r>
-              <a:rPr lang="es-ES" dirty="0" err="1" smtClean="0"/>
-              <a:t>Definicion</a:t>
+              <a:rPr lang="es-ES" dirty="0" smtClean="0"/>
+              <a:t>Definición</a:t>
             </a:r>
             <a:r>
               <a:rPr lang="es-ES" dirty="0" smtClean="0"/>
@@ -8035,8 +8040,13 @@
           <a:p>
             <a:r>
               <a:rPr lang="es-ES" dirty="0" smtClean="0"/>
-              <a:t>Proteinuria generalmente menor de 3.5g/24hs</a:t>
-            </a:r>
+              <a:t>Proteinuria generalmente menor de </a:t>
+            </a:r>
+            <a:r>
+              <a:rPr lang="es-ES" dirty="0" smtClean="0"/>
+              <a:t>3.5g/24hs (no rango nefrótico)</a:t>
+            </a:r>
+            <a:endParaRPr lang="es-ES" dirty="0" smtClean="0"/>
           </a:p>
           <a:p>
             <a:r>
@@ -8053,8 +8063,17 @@
           <a:p>
             <a:r>
               <a:rPr lang="es-ES" dirty="0" smtClean="0"/>
-              <a:t>Edema.</a:t>
-            </a:r>
+              <a:t>Edema (maleolar y </a:t>
+            </a:r>
+            <a:r>
+              <a:rPr lang="es-ES" dirty="0" err="1" smtClean="0"/>
+              <a:t>periorbital</a:t>
+            </a:r>
+            <a:r>
+              <a:rPr lang="es-ES" dirty="0" smtClean="0"/>
+              <a:t>)</a:t>
+            </a:r>
+            <a:endParaRPr lang="es-ES" dirty="0" smtClean="0"/>
           </a:p>
           <a:p>
             <a:pPr marL="0" indent="0">
@@ -8173,11 +8192,15 @@
             </a:r>
             <a:r>
               <a:rPr lang="es-ES" dirty="0" err="1" smtClean="0"/>
-              <a:t>postestreptococica</a:t>
-            </a:r>
-            <a:r>
-              <a:rPr lang="es-ES" dirty="0" smtClean="0"/>
-              <a:t> (estreptococo beta hemolítico del grupo A) u otras bacterias y </a:t>
+              <a:t>postestreptococcica</a:t>
+            </a:r>
+            <a:r>
+              <a:rPr lang="es-ES" dirty="0" smtClean="0"/>
+              <a:t> </a:t>
+            </a:r>
+            <a:r>
+              <a:rPr lang="es-ES" dirty="0" smtClean="0"/>
+              <a:t>(estreptococo beta hemolítico del grupo A) u otras bacterias y </a:t>
             </a:r>
             <a:r>
               <a:rPr lang="es-ES" dirty="0" err="1" smtClean="0"/>
@@ -8404,7 +8427,7 @@
               <a:t>(</a:t>
             </a:r>
             <a:r>
-              <a:rPr lang="es-ES" i="1" dirty="0" err="1" smtClean="0"/>
+              <a:rPr lang="es-ES" b="1" i="1" dirty="0" err="1" smtClean="0"/>
               <a:t>Hipocomplementemia</a:t>
             </a:r>
             <a:r>
@@ -8658,7 +8681,15 @@
             </a:r>
             <a:r>
               <a:rPr lang="es-ES" dirty="0" smtClean="0"/>
-              <a:t> secundarias a enfermedad sistémica, se agregar signos y síntomas propios de la enfermedad (</a:t>
+              <a:t> secundarias a enfermedad sistémica, se </a:t>
+            </a:r>
+            <a:r>
+              <a:rPr lang="es-ES" dirty="0" smtClean="0"/>
+              <a:t>agregan </a:t>
+            </a:r>
+            <a:r>
+              <a:rPr lang="es-ES" dirty="0" smtClean="0"/>
+              <a:t>signos y síntomas propios de la enfermedad (</a:t>
             </a:r>
             <a:r>
               <a:rPr lang="es-ES" dirty="0" err="1" smtClean="0"/>

</xml_diff>